<commit_message>
kisebb szépséghibák javítása(effektek ideje, képekre szegély)
</commit_message>
<xml_diff>
--- a/projekt1_bemutato.pptx
+++ b/projekt1_bemutato.pptx
@@ -982,8 +982,8 @@
       </dsp:nvSpPr>
       <dsp:spPr>
         <a:xfrm>
-          <a:off x="0" y="171634"/>
-          <a:ext cx="9597779" cy="1450800"/>
+          <a:off x="0" y="1573"/>
+          <a:ext cx="9597779" cy="1620861"/>
         </a:xfrm>
         <a:prstGeom prst="roundRect">
           <a:avLst/>
@@ -1045,8 +1045,8 @@
         </a:p>
       </dsp:txBody>
       <dsp:txXfrm>
-        <a:off x="70822" y="242456"/>
-        <a:ext cx="9456135" cy="1309156"/>
+        <a:off x="79124" y="80697"/>
+        <a:ext cx="9439531" cy="1462613"/>
       </dsp:txXfrm>
     </dsp:sp>
   </dsp:spTree>
@@ -9518,7 +9518,7 @@
                                     </p:set>
                                     <p:animEffect transition="in" filter="circle(in)">
                                       <p:cBhvr>
-                                        <p:cTn id="49" dur="2000"/>
+                                        <p:cTn id="49" dur="1000"/>
                                         <p:tgtEl>
                                           <p:spTgt spid="37"/>
                                         </p:tgtEl>
@@ -9533,7 +9533,7 @@
                         <p:par>
                           <p:cTn id="50" fill="hold">
                             <p:stCondLst>
-                              <p:cond delay="5000"/>
+                              <p:cond delay="4000"/>
                             </p:stCondLst>
                             <p:childTnLst>
                               <p:par>
@@ -9623,7 +9623,7 @@
                         <p:par>
                           <p:cTn id="56" fill="hold">
                             <p:stCondLst>
-                              <p:cond delay="6000"/>
+                              <p:cond delay="5000"/>
                             </p:stCondLst>
                             <p:childTnLst>
                               <p:par>
@@ -9666,7 +9666,7 @@
                         <p:par>
                           <p:cTn id="59" fill="hold">
                             <p:stCondLst>
-                              <p:cond delay="9901"/>
+                              <p:cond delay="8901"/>
                             </p:stCondLst>
                             <p:childTnLst>
                               <p:par>
@@ -9729,7 +9729,7 @@
                                   <p:childTnLst>
                                     <p:animEffect transition="out" filter="circle(out)">
                                       <p:cBhvr>
-                                        <p:cTn id="65" dur="2000"/>
+                                        <p:cTn id="65" dur="1000"/>
                                         <p:tgtEl>
                                           <p:spTgt spid="37"/>
                                         </p:tgtEl>
@@ -9739,7 +9739,7 @@
                                       <p:cBhvr>
                                         <p:cTn id="66" dur="1" fill="hold">
                                           <p:stCondLst>
-                                            <p:cond delay="1999"/>
+                                            <p:cond delay="999"/>
                                           </p:stCondLst>
                                         </p:cTn>
                                         <p:tgtEl>
@@ -9762,7 +9762,7 @@
                         <p:par>
                           <p:cTn id="67" fill="hold">
                             <p:stCondLst>
-                              <p:cond delay="2000"/>
+                              <p:cond delay="1000"/>
                             </p:stCondLst>
                             <p:childTnLst>
                               <p:par>
@@ -9817,7 +9817,7 @@
                         <p:par>
                           <p:cTn id="71" fill="hold">
                             <p:stCondLst>
-                              <p:cond delay="2500"/>
+                              <p:cond delay="1500"/>
                             </p:stCondLst>
                             <p:childTnLst>
                               <p:par>
@@ -9872,7 +9872,7 @@
                         <p:par>
                           <p:cTn id="75" fill="hold">
                             <p:stCondLst>
-                              <p:cond delay="3000"/>
+                              <p:cond delay="2000"/>
                             </p:stCondLst>
                             <p:childTnLst>
                               <p:par>
@@ -9901,7 +9901,7 @@
                                     </p:set>
                                     <p:animEffect transition="in" filter="circle(in)">
                                       <p:cBhvr>
-                                        <p:cTn id="78" dur="2000"/>
+                                        <p:cTn id="78" dur="1000"/>
                                         <p:tgtEl>
                                           <p:spTgt spid="25"/>
                                         </p:tgtEl>
@@ -9916,7 +9916,7 @@
                         <p:par>
                           <p:cTn id="79" fill="hold">
                             <p:stCondLst>
-                              <p:cond delay="5000"/>
+                              <p:cond delay="3000"/>
                             </p:stCondLst>
                             <p:childTnLst>
                               <p:par>
@@ -9979,7 +9979,7 @@
                                   <p:childTnLst>
                                     <p:animEffect transition="out" filter="circle(out)">
                                       <p:cBhvr>
-                                        <p:cTn id="85" dur="2000"/>
+                                        <p:cTn id="85" dur="1000"/>
                                         <p:tgtEl>
                                           <p:spTgt spid="25"/>
                                         </p:tgtEl>
@@ -9989,7 +9989,7 @@
                                       <p:cBhvr>
                                         <p:cTn id="86" dur="1" fill="hold">
                                           <p:stCondLst>
-                                            <p:cond delay="1999"/>
+                                            <p:cond delay="999"/>
                                           </p:stCondLst>
                                         </p:cTn>
                                         <p:tgtEl>
@@ -10012,7 +10012,7 @@
                         <p:par>
                           <p:cTn id="87" fill="hold">
                             <p:stCondLst>
-                              <p:cond delay="2000"/>
+                              <p:cond delay="1000"/>
                             </p:stCondLst>
                             <p:childTnLst>
                               <p:par>
@@ -10067,7 +10067,7 @@
                         <p:par>
                           <p:cTn id="91" fill="hold">
                             <p:stCondLst>
-                              <p:cond delay="2500"/>
+                              <p:cond delay="1500"/>
                             </p:stCondLst>
                             <p:childTnLst>
                               <p:par>
@@ -10096,7 +10096,7 @@
                                     </p:set>
                                     <p:animEffect transition="in" filter="circle(in)">
                                       <p:cBhvr>
-                                        <p:cTn id="94" dur="2000"/>
+                                        <p:cTn id="94" dur="1000"/>
                                         <p:tgtEl>
                                           <p:spTgt spid="26"/>
                                         </p:tgtEl>
@@ -10111,7 +10111,7 @@
                         <p:par>
                           <p:cTn id="95" fill="hold">
                             <p:stCondLst>
-                              <p:cond delay="4500"/>
+                              <p:cond delay="2500"/>
                             </p:stCondLst>
                             <p:childTnLst>
                               <p:par>
@@ -10154,7 +10154,7 @@
                         <p:par>
                           <p:cTn id="98" fill="hold">
                             <p:stCondLst>
-                              <p:cond delay="8301"/>
+                              <p:cond delay="6301"/>
                             </p:stCondLst>
                             <p:childTnLst>
                               <p:par>
@@ -10197,7 +10197,7 @@
                         <p:par>
                           <p:cTn id="101" fill="hold">
                             <p:stCondLst>
-                              <p:cond delay="9702"/>
+                              <p:cond delay="7702"/>
                             </p:stCondLst>
                             <p:childTnLst>
                               <p:par>
@@ -12099,7 +12099,7 @@
                                     </p:set>
                                     <p:animEffect transition="in" filter="circle(in)">
                                       <p:cBhvr>
-                                        <p:cTn id="49" dur="2000"/>
+                                        <p:cTn id="49" dur="1000"/>
                                         <p:tgtEl>
                                           <p:spTgt spid="37"/>
                                         </p:tgtEl>
@@ -12114,7 +12114,7 @@
                         <p:par>
                           <p:cTn id="50" fill="hold">
                             <p:stCondLst>
-                              <p:cond delay="5000"/>
+                              <p:cond delay="4000"/>
                             </p:stCondLst>
                             <p:childTnLst>
                               <p:par>
@@ -12204,7 +12204,7 @@
                         <p:par>
                           <p:cTn id="56" fill="hold">
                             <p:stCondLst>
-                              <p:cond delay="6000"/>
+                              <p:cond delay="5000"/>
                             </p:stCondLst>
                             <p:childTnLst>
                               <p:par>
@@ -12247,7 +12247,7 @@
                         <p:par>
                           <p:cTn id="59" fill="hold">
                             <p:stCondLst>
-                              <p:cond delay="6951"/>
+                              <p:cond delay="5951"/>
                             </p:stCondLst>
                             <p:childTnLst>
                               <p:par>
@@ -12290,7 +12290,7 @@
                         <p:par>
                           <p:cTn id="62" fill="hold">
                             <p:stCondLst>
-                              <p:cond delay="7602"/>
+                              <p:cond delay="6602"/>
                             </p:stCondLst>
                             <p:childTnLst>
                               <p:par>
@@ -12333,7 +12333,7 @@
                         <p:par>
                           <p:cTn id="65" fill="hold">
                             <p:stCondLst>
-                              <p:cond delay="8253"/>
+                              <p:cond delay="7253"/>
                             </p:stCondLst>
                             <p:childTnLst>
                               <p:par>
@@ -12396,7 +12396,7 @@
                                   <p:childTnLst>
                                     <p:animEffect transition="out" filter="circle(out)">
                                       <p:cBhvr>
-                                        <p:cTn id="71" dur="2000"/>
+                                        <p:cTn id="71" dur="1000"/>
                                         <p:tgtEl>
                                           <p:spTgt spid="37"/>
                                         </p:tgtEl>
@@ -12406,7 +12406,7 @@
                                       <p:cBhvr>
                                         <p:cTn id="72" dur="1" fill="hold">
                                           <p:stCondLst>
-                                            <p:cond delay="1999"/>
+                                            <p:cond delay="999"/>
                                           </p:stCondLst>
                                         </p:cTn>
                                         <p:tgtEl>
@@ -12429,7 +12429,7 @@
                         <p:par>
                           <p:cTn id="73" fill="hold">
                             <p:stCondLst>
-                              <p:cond delay="2000"/>
+                              <p:cond delay="1000"/>
                             </p:stCondLst>
                             <p:childTnLst>
                               <p:par>
@@ -12622,7 +12622,7 @@
                         <p:par>
                           <p:cTn id="86" fill="hold">
                             <p:stCondLst>
-                              <p:cond delay="2500"/>
+                              <p:cond delay="1500"/>
                             </p:stCondLst>
                             <p:childTnLst>
                               <p:par>
@@ -12651,7 +12651,7 @@
                                     </p:set>
                                     <p:animEffect transition="in" filter="circle(in)">
                                       <p:cBhvr>
-                                        <p:cTn id="89" dur="2000"/>
+                                        <p:cTn id="89" dur="1000"/>
                                         <p:tgtEl>
                                           <p:spTgt spid="25"/>
                                         </p:tgtEl>
@@ -12666,7 +12666,7 @@
                         <p:par>
                           <p:cTn id="90" fill="hold">
                             <p:stCondLst>
-                              <p:cond delay="4500"/>
+                              <p:cond delay="2500"/>
                             </p:stCondLst>
                             <p:childTnLst>
                               <p:par>
@@ -12709,7 +12709,7 @@
                         <p:par>
                           <p:cTn id="93" fill="hold">
                             <p:stCondLst>
-                              <p:cond delay="5551"/>
+                              <p:cond delay="3551"/>
                             </p:stCondLst>
                             <p:childTnLst>
                               <p:par>
@@ -12752,7 +12752,7 @@
                         <p:par>
                           <p:cTn id="96" fill="hold">
                             <p:stCondLst>
-                              <p:cond delay="6502"/>
+                              <p:cond delay="4502"/>
                             </p:stCondLst>
                             <p:childTnLst>
                               <p:par>
@@ -12795,7 +12795,7 @@
                         <p:par>
                           <p:cTn id="99" fill="hold">
                             <p:stCondLst>
-                              <p:cond delay="7753"/>
+                              <p:cond delay="5753"/>
                             </p:stCondLst>
                             <p:childTnLst>
                               <p:par>
@@ -12858,7 +12858,7 @@
                                   <p:childTnLst>
                                     <p:animEffect transition="out" filter="circle(out)">
                                       <p:cBhvr>
-                                        <p:cTn id="105" dur="2000"/>
+                                        <p:cTn id="105" dur="1000"/>
                                         <p:tgtEl>
                                           <p:spTgt spid="25"/>
                                         </p:tgtEl>
@@ -12868,7 +12868,7 @@
                                       <p:cBhvr>
                                         <p:cTn id="106" dur="1" fill="hold">
                                           <p:stCondLst>
-                                            <p:cond delay="1999"/>
+                                            <p:cond delay="999"/>
                                           </p:stCondLst>
                                         </p:cTn>
                                         <p:tgtEl>
@@ -12891,7 +12891,7 @@
                         <p:par>
                           <p:cTn id="107" fill="hold">
                             <p:stCondLst>
-                              <p:cond delay="2000"/>
+                              <p:cond delay="1000"/>
                             </p:stCondLst>
                             <p:childTnLst>
                               <p:par>
@@ -13084,7 +13084,7 @@
                         <p:par>
                           <p:cTn id="120" fill="hold">
                             <p:stCondLst>
-                              <p:cond delay="2500"/>
+                              <p:cond delay="1500"/>
                             </p:stCondLst>
                             <p:childTnLst>
                               <p:par>
@@ -13113,7 +13113,7 @@
                                     </p:set>
                                     <p:animEffect transition="in" filter="circle(in)">
                                       <p:cBhvr>
-                                        <p:cTn id="123" dur="2000"/>
+                                        <p:cTn id="123" dur="1000"/>
                                         <p:tgtEl>
                                           <p:spTgt spid="26"/>
                                         </p:tgtEl>
@@ -13128,7 +13128,7 @@
                         <p:par>
                           <p:cTn id="124" fill="hold">
                             <p:stCondLst>
-                              <p:cond delay="4500"/>
+                              <p:cond delay="2500"/>
                             </p:stCondLst>
                             <p:childTnLst>
                               <p:par>
@@ -13381,6 +13381,36 @@
           <a:prstGeom prst="rect">
             <a:avLst/>
           </a:prstGeom>
+          <a:solidFill>
+            <a:srgbClr val="FFFFFF">
+              <a:shade val="85000"/>
+            </a:srgbClr>
+          </a:solidFill>
+          <a:ln w="88900" cap="sq">
+            <a:solidFill>
+              <a:srgbClr val="FFFFFF"/>
+            </a:solidFill>
+            <a:miter lim="800000"/>
+          </a:ln>
+          <a:effectLst>
+            <a:outerShdw blurRad="55000" dist="18000" dir="5400000" algn="tl" rotWithShape="0">
+              <a:srgbClr val="000000">
+                <a:alpha val="40000"/>
+              </a:srgbClr>
+            </a:outerShdw>
+          </a:effectLst>
+          <a:scene3d>
+            <a:camera prst="orthographicFront"/>
+            <a:lightRig rig="twoPt" dir="t">
+              <a:rot lat="0" lon="0" rev="7200000"/>
+            </a:lightRig>
+          </a:scene3d>
+          <a:sp3d>
+            <a:bevelT w="25400" h="19050"/>
+            <a:contourClr>
+              <a:srgbClr val="FFFFFF"/>
+            </a:contourClr>
+          </a:sp3d>
         </p:spPr>
       </p:pic>
       <p:pic>
@@ -13411,6 +13441,36 @@
           <a:prstGeom prst="rect">
             <a:avLst/>
           </a:prstGeom>
+          <a:solidFill>
+            <a:srgbClr val="FFFFFF">
+              <a:shade val="85000"/>
+            </a:srgbClr>
+          </a:solidFill>
+          <a:ln w="88900" cap="sq">
+            <a:solidFill>
+              <a:srgbClr val="FFFFFF"/>
+            </a:solidFill>
+            <a:miter lim="800000"/>
+          </a:ln>
+          <a:effectLst>
+            <a:outerShdw blurRad="55000" dist="18000" dir="5400000" algn="tl" rotWithShape="0">
+              <a:srgbClr val="000000">
+                <a:alpha val="40000"/>
+              </a:srgbClr>
+            </a:outerShdw>
+          </a:effectLst>
+          <a:scene3d>
+            <a:camera prst="orthographicFront"/>
+            <a:lightRig rig="twoPt" dir="t">
+              <a:rot lat="0" lon="0" rev="7200000"/>
+            </a:lightRig>
+          </a:scene3d>
+          <a:sp3d>
+            <a:bevelT w="25400" h="19050"/>
+            <a:contourClr>
+              <a:srgbClr val="FFFFFF"/>
+            </a:contourClr>
+          </a:sp3d>
         </p:spPr>
       </p:pic>
       <p:pic>
@@ -13435,12 +13495,42 @@
         </p:blipFill>
         <p:spPr>
           <a:xfrm>
-            <a:off x="1633495" y="1550389"/>
+            <a:off x="1703198" y="1607845"/>
             <a:ext cx="8785603" cy="5011801"/>
           </a:xfrm>
           <a:prstGeom prst="rect">
             <a:avLst/>
           </a:prstGeom>
+          <a:solidFill>
+            <a:srgbClr val="FFFFFF">
+              <a:shade val="85000"/>
+            </a:srgbClr>
+          </a:solidFill>
+          <a:ln w="88900" cap="sq">
+            <a:solidFill>
+              <a:srgbClr val="FFFFFF"/>
+            </a:solidFill>
+            <a:miter lim="800000"/>
+          </a:ln>
+          <a:effectLst>
+            <a:outerShdw blurRad="55000" dist="18000" dir="5400000" algn="tl" rotWithShape="0">
+              <a:srgbClr val="000000">
+                <a:alpha val="40000"/>
+              </a:srgbClr>
+            </a:outerShdw>
+          </a:effectLst>
+          <a:scene3d>
+            <a:camera prst="orthographicFront"/>
+            <a:lightRig rig="twoPt" dir="t">
+              <a:rot lat="0" lon="0" rev="7200000"/>
+            </a:lightRig>
+          </a:scene3d>
+          <a:sp3d>
+            <a:bevelT w="25400" h="19050"/>
+            <a:contourClr>
+              <a:srgbClr val="FFFFFF"/>
+            </a:contourClr>
+          </a:sp3d>
         </p:spPr>
       </p:pic>
       <p:pic>
@@ -13465,12 +13555,42 @@
         </p:blipFill>
         <p:spPr>
           <a:xfrm>
-            <a:off x="1917782" y="2057549"/>
+            <a:off x="1917781" y="1959487"/>
             <a:ext cx="8356436" cy="4504641"/>
           </a:xfrm>
           <a:prstGeom prst="rect">
             <a:avLst/>
           </a:prstGeom>
+          <a:solidFill>
+            <a:srgbClr val="FFFFFF">
+              <a:shade val="85000"/>
+            </a:srgbClr>
+          </a:solidFill>
+          <a:ln w="88900" cap="sq">
+            <a:solidFill>
+              <a:srgbClr val="FFFFFF"/>
+            </a:solidFill>
+            <a:miter lim="800000"/>
+          </a:ln>
+          <a:effectLst>
+            <a:outerShdw blurRad="55000" dist="18000" dir="5400000" algn="tl" rotWithShape="0">
+              <a:srgbClr val="000000">
+                <a:alpha val="40000"/>
+              </a:srgbClr>
+            </a:outerShdw>
+          </a:effectLst>
+          <a:scene3d>
+            <a:camera prst="orthographicFront"/>
+            <a:lightRig rig="twoPt" dir="t">
+              <a:rot lat="0" lon="0" rev="7200000"/>
+            </a:lightRig>
+          </a:scene3d>
+          <a:sp3d>
+            <a:bevelT w="25400" h="19050"/>
+            <a:contourClr>
+              <a:srgbClr val="FFFFFF"/>
+            </a:contourClr>
+          </a:sp3d>
         </p:spPr>
       </p:pic>
     </p:spTree>
@@ -15834,6 +15954,141 @@
           </a:prstGeom>
         </p:spPr>
       </p:pic>
+      <p:grpSp>
+        <p:nvGrpSpPr>
+          <p:cNvPr id="7" name="Csoportba foglalás 6">
+            <a:extLst>
+              <a:ext uri="{FF2B5EF4-FFF2-40B4-BE49-F238E27FC236}">
+                <a16:creationId xmlns:a16="http://schemas.microsoft.com/office/drawing/2014/main" id="{CE25CBAC-1694-4758-86BA-E7C2C87669E1}"/>
+              </a:ext>
+            </a:extLst>
+          </p:cNvPr>
+          <p:cNvGrpSpPr/>
+          <p:nvPr/>
+        </p:nvGrpSpPr>
+        <p:grpSpPr>
+          <a:xfrm>
+            <a:off x="1760085" y="6317933"/>
+            <a:ext cx="8671828" cy="344681"/>
+            <a:chOff x="0" y="14470"/>
+            <a:chExt cx="9302620" cy="1432080"/>
+          </a:xfrm>
+        </p:grpSpPr>
+        <p:sp>
+          <p:nvSpPr>
+            <p:cNvPr id="9" name="Téglalap: lekerekített 8">
+              <a:extLst>
+                <a:ext uri="{FF2B5EF4-FFF2-40B4-BE49-F238E27FC236}">
+                  <a16:creationId xmlns:a16="http://schemas.microsoft.com/office/drawing/2014/main" id="{6344D866-F0BF-4E64-90EC-AE86E216AFBF}"/>
+                </a:ext>
+              </a:extLst>
+            </p:cNvPr>
+            <p:cNvSpPr/>
+            <p:nvPr/>
+          </p:nvSpPr>
+          <p:spPr>
+            <a:xfrm>
+              <a:off x="0" y="14470"/>
+              <a:ext cx="9302620" cy="1432080"/>
+            </a:xfrm>
+            <a:prstGeom prst="roundRect">
+              <a:avLst/>
+            </a:prstGeom>
+            <a:solidFill>
+              <a:srgbClr val="191C29"/>
+            </a:solidFill>
+            <a:ln>
+              <a:noFill/>
+            </a:ln>
+          </p:spPr>
+          <p:style>
+            <a:lnRef idx="2">
+              <a:scrgbClr r="0" g="0" b="0"/>
+            </a:lnRef>
+            <a:fillRef idx="1">
+              <a:scrgbClr r="0" g="0" b="0"/>
+            </a:fillRef>
+            <a:effectRef idx="0">
+              <a:schemeClr val="accent1">
+                <a:hueOff val="0"/>
+                <a:satOff val="0"/>
+                <a:lumOff val="0"/>
+                <a:alphaOff val="0"/>
+              </a:schemeClr>
+            </a:effectRef>
+            <a:fontRef idx="minor">
+              <a:schemeClr val="lt1"/>
+            </a:fontRef>
+          </p:style>
+        </p:sp>
+        <p:sp>
+          <p:nvSpPr>
+            <p:cNvPr id="10" name="Téglalap: lekerekített 4">
+              <a:extLst>
+                <a:ext uri="{FF2B5EF4-FFF2-40B4-BE49-F238E27FC236}">
+                  <a16:creationId xmlns:a16="http://schemas.microsoft.com/office/drawing/2014/main" id="{20EEC815-DB46-43FF-A880-F276120B64C0}"/>
+                </a:ext>
+              </a:extLst>
+            </p:cNvPr>
+            <p:cNvSpPr txBox="1"/>
+            <p:nvPr/>
+          </p:nvSpPr>
+          <p:spPr>
+            <a:xfrm>
+              <a:off x="69908" y="84378"/>
+              <a:ext cx="9232712" cy="1292263"/>
+            </a:xfrm>
+            <a:prstGeom prst="rect">
+              <a:avLst/>
+            </a:prstGeom>
+          </p:spPr>
+          <p:style>
+            <a:lnRef idx="0">
+              <a:scrgbClr r="0" g="0" b="0"/>
+            </a:lnRef>
+            <a:fillRef idx="0">
+              <a:scrgbClr r="0" g="0" b="0"/>
+            </a:fillRef>
+            <a:effectRef idx="0">
+              <a:scrgbClr r="0" g="0" b="0"/>
+            </a:effectRef>
+            <a:fontRef idx="minor">
+              <a:schemeClr val="lt1"/>
+            </a:fontRef>
+          </p:style>
+          <p:txBody>
+            <a:bodyPr spcFirstLastPara="0" vert="horz" wrap="square" lIns="137160" tIns="137160" rIns="137160" bIns="137160" numCol="1" spcCol="1270" anchor="ctr" anchorCtr="0">
+              <a:noAutofit/>
+            </a:bodyPr>
+            <a:lstStyle/>
+            <a:p>
+              <a:pPr lvl="0" defTabSz="1600200">
+                <a:lnSpc>
+                  <a:spcPct val="90000"/>
+                </a:lnSpc>
+                <a:spcBef>
+                  <a:spcPct val="0"/>
+                </a:spcBef>
+                <a:spcAft>
+                  <a:spcPct val="35000"/>
+                </a:spcAft>
+              </a:pPr>
+              <a:r>
+                <a:rPr lang="hu-HU" b="1" i="1" dirty="0"/>
+                <a:t>Projekt </a:t>
+              </a:r>
+              <a:r>
+                <a:rPr lang="hu-HU" b="1" i="1" dirty="0" err="1"/>
+                <a:t>repo</a:t>
+              </a:r>
+              <a:r>
+                <a:rPr lang="hu-HU" b="1" i="1" dirty="0"/>
+                <a:t> linkje: https://github.com/Csapii/1-projekt-WEBSZERKESZTES-AlphaTeam</a:t>
+              </a:r>
+            </a:p>
+          </p:txBody>
+        </p:sp>
+      </p:grpSp>
     </p:spTree>
     <p:extLst>
       <p:ext uri="{BB962C8B-B14F-4D97-AF65-F5344CB8AC3E}">
@@ -15908,6 +16163,96 @@
                                         <p:cTn id="7" dur="500"/>
                                         <p:tgtEl>
                                           <p:spTgt spid="8"/>
+                                        </p:tgtEl>
+                                      </p:cBhvr>
+                                    </p:animEffect>
+                                  </p:childTnLst>
+                                </p:cTn>
+                              </p:par>
+                            </p:childTnLst>
+                          </p:cTn>
+                        </p:par>
+                        <p:par>
+                          <p:cTn id="8" fill="hold">
+                            <p:stCondLst>
+                              <p:cond delay="500"/>
+                            </p:stCondLst>
+                            <p:childTnLst>
+                              <p:par>
+                                <p:cTn id="9" presetID="53" presetClass="entr" presetSubtype="16" fill="hold" nodeType="afterEffect">
+                                  <p:stCondLst>
+                                    <p:cond delay="0"/>
+                                  </p:stCondLst>
+                                  <p:childTnLst>
+                                    <p:set>
+                                      <p:cBhvr>
+                                        <p:cTn id="10" dur="1" fill="hold">
+                                          <p:stCondLst>
+                                            <p:cond delay="0"/>
+                                          </p:stCondLst>
+                                        </p:cTn>
+                                        <p:tgtEl>
+                                          <p:spTgt spid="7"/>
+                                        </p:tgtEl>
+                                        <p:attrNameLst>
+                                          <p:attrName>style.visibility</p:attrName>
+                                        </p:attrNameLst>
+                                      </p:cBhvr>
+                                      <p:to>
+                                        <p:strVal val="visible"/>
+                                      </p:to>
+                                    </p:set>
+                                    <p:anim calcmode="lin" valueType="num">
+                                      <p:cBhvr>
+                                        <p:cTn id="11" dur="500" fill="hold"/>
+                                        <p:tgtEl>
+                                          <p:spTgt spid="7"/>
+                                        </p:tgtEl>
+                                        <p:attrNameLst>
+                                          <p:attrName>ppt_w</p:attrName>
+                                        </p:attrNameLst>
+                                      </p:cBhvr>
+                                      <p:tavLst>
+                                        <p:tav tm="0">
+                                          <p:val>
+                                            <p:fltVal val="0"/>
+                                          </p:val>
+                                        </p:tav>
+                                        <p:tav tm="100000">
+                                          <p:val>
+                                            <p:strVal val="#ppt_w"/>
+                                          </p:val>
+                                        </p:tav>
+                                      </p:tavLst>
+                                    </p:anim>
+                                    <p:anim calcmode="lin" valueType="num">
+                                      <p:cBhvr>
+                                        <p:cTn id="12" dur="500" fill="hold"/>
+                                        <p:tgtEl>
+                                          <p:spTgt spid="7"/>
+                                        </p:tgtEl>
+                                        <p:attrNameLst>
+                                          <p:attrName>ppt_h</p:attrName>
+                                        </p:attrNameLst>
+                                      </p:cBhvr>
+                                      <p:tavLst>
+                                        <p:tav tm="0">
+                                          <p:val>
+                                            <p:fltVal val="0"/>
+                                          </p:val>
+                                        </p:tav>
+                                        <p:tav tm="100000">
+                                          <p:val>
+                                            <p:strVal val="#ppt_h"/>
+                                          </p:val>
+                                        </p:tav>
+                                      </p:tavLst>
+                                    </p:anim>
+                                    <p:animEffect transition="in" filter="fade">
+                                      <p:cBhvr>
+                                        <p:cTn id="13" dur="500"/>
+                                        <p:tgtEl>
+                                          <p:spTgt spid="7"/>
                                         </p:tgtEl>
                                       </p:cBhvr>
                                     </p:animEffect>

</xml_diff>